<commit_message>
Latest Version of Slides
</commit_message>
<xml_diff>
--- a/CS524_FinalProject_1.pptx
+++ b/CS524_FinalProject_1.pptx
@@ -132,7 +132,7 @@
 <file path=ppt/revisionInfo.xml><?xml version="1.0" encoding="utf-8"?>
 <p1510:revInfo xmlns:a="http://schemas.openxmlformats.org/drawingml/2006/main" xmlns:r="http://schemas.openxmlformats.org/officeDocument/2006/relationships" xmlns:p1510="http://schemas.microsoft.com/office/powerpoint/2015/10/main">
   <p1510:revLst>
-    <p1510:client id="{00126417-CDAD-262D-58FC-4EA857E8BC1B}" v="4171" dt="2023-12-04T02:08:41.131"/>
+    <p1510:client id="{00126417-CDAD-262D-58FC-4EA857E8BC1B}" v="4181" dt="2023-12-04T02:15:10.625"/>
   </p1510:revLst>
 </p1510:revInfo>
 </file>
@@ -7277,7 +7277,7 @@
         <p:spPr>
           <a:xfrm>
             <a:off x="136250" y="1753774"/>
-            <a:ext cx="3957156" cy="2003151"/>
+            <a:ext cx="3846722" cy="1947934"/>
           </a:xfrm>
           <a:prstGeom prst="rect">
             <a:avLst/>
@@ -7306,8 +7306,8 @@
         </p:blipFill>
         <p:spPr>
           <a:xfrm>
-            <a:off x="3916362" y="1749011"/>
-            <a:ext cx="3906493" cy="1990589"/>
+            <a:off x="3993666" y="1749011"/>
+            <a:ext cx="3829189" cy="1935372"/>
           </a:xfrm>
           <a:prstGeom prst="rect">
             <a:avLst/>
@@ -7337,7 +7337,7 @@
         <p:spPr>
           <a:xfrm>
             <a:off x="7924939" y="1749011"/>
-            <a:ext cx="4039428" cy="1990587"/>
+            <a:ext cx="3951081" cy="1935370"/>
           </a:xfrm>
           <a:prstGeom prst="rect">
             <a:avLst/>
@@ -7431,49 +7431,6 @@
             <a:endParaRPr lang="en-US" sz="3200" b="1" dirty="0">
               <a:latin typeface="Times New Roman" panose="02020503050405090304" pitchFamily="18" charset="0"/>
               <a:cs typeface="Times New Roman" panose="02020503050405090304" pitchFamily="18" charset="0"/>
-            </a:endParaRPr>
-          </a:p>
-        </p:txBody>
-      </p:sp>
-      <p:sp>
-        <p:nvSpPr>
-          <p:cNvPr id="7" name="TextBox 6"/>
-          <p:cNvSpPr txBox="1"/>
-          <p:nvPr/>
-        </p:nvSpPr>
-        <p:spPr>
-          <a:xfrm>
-            <a:off x="846325" y="1313898"/>
-            <a:ext cx="10420159" cy="707886"/>
-          </a:xfrm>
-          <a:prstGeom prst="rect">
-            <a:avLst/>
-          </a:prstGeom>
-          <a:noFill/>
-        </p:spPr>
-        <p:txBody>
-          <a:bodyPr wrap="square" lIns="91440" tIns="45720" rIns="91440" bIns="45720" rtlCol="0" anchor="t">
-            <a:spAutoFit/>
-          </a:bodyPr>
-          <a:lstStyle/>
-          <a:p>
-            <a:pPr marL="342900" indent="-342900">
-              <a:buFont typeface="Wingdings"/>
-              <a:buChar char="Ø"/>
-            </a:pPr>
-            <a:endParaRPr lang="en-US" sz="2000" b="1" dirty="0">
-              <a:latin typeface="Times New Roman"/>
-              <a:cs typeface="Times New Roman"/>
-            </a:endParaRPr>
-          </a:p>
-          <a:p>
-            <a:pPr marL="800100" lvl="1" indent="-342900">
-              <a:buFont typeface="Courier New"/>
-              <a:buChar char="o"/>
-            </a:pPr>
-            <a:endParaRPr lang="en-US" sz="2000" dirty="0">
-              <a:latin typeface="Times New Roman"/>
-              <a:cs typeface="Times New Roman"/>
             </a:endParaRPr>
           </a:p>
         </p:txBody>

</xml_diff>